<commit_message>
Iliyan fixed basically everything.
</commit_message>
<xml_diff>
--- a/CVT(viviti.pptx
+++ b/CVT(viviti.pptx
@@ -3495,10 +3495,6 @@
               <a:rPr lang="en-US" dirty="0" smtClean="0"/>
               <a:t>CVT</a:t>
             </a:r>
-            <a:r>
-              <a:rPr lang="en-US" dirty="0" smtClean="0"/>
-              <a:t/>
-            </a:r>
             <a:br>
               <a:rPr lang="en-US" dirty="0" smtClean="0"/>
             </a:br>
@@ -3584,6 +3580,13 @@
   <p:clrMapOvr>
     <a:masterClrMapping/>
   </p:clrMapOvr>
+  <p:timing>
+    <p:tnLst>
+      <p:par>
+        <p:cTn id="1" dur="indefinite" restart="never" nodeType="tmRoot"/>
+      </p:par>
+    </p:tnLst>
+  </p:timing>
 </p:sld>
 </file>
 
@@ -3686,7 +3689,7 @@
         </p:blipFill>
         <p:spPr>
           <a:xfrm>
-            <a:off x="8839473" y="4314533"/>
+            <a:off x="8761096" y="4314533"/>
             <a:ext cx="2543467" cy="2543467"/>
           </a:xfrm>
           <a:prstGeom prst="rect">
@@ -3704,6 +3707,13 @@
   <p:clrMapOvr>
     <a:masterClrMapping/>
   </p:clrMapOvr>
+  <p:timing>
+    <p:tnLst>
+      <p:par>
+        <p:cTn id="1" dur="indefinite" restart="never" nodeType="tmRoot"/>
+      </p:par>
+    </p:tnLst>
+  </p:timing>
 </p:sld>
 </file>
 
@@ -3777,7 +3787,6 @@
               <a:rPr lang="bg-BG" sz="4000" dirty="0" smtClean="0"/>
               <a:t> </a:t>
             </a:r>
-            <a:endParaRPr lang="bg-BG" sz="4000" dirty="0" smtClean="0"/>
           </a:p>
           <a:p>
             <a:r>
@@ -3820,6 +3829,13 @@
   <p:clrMapOvr>
     <a:masterClrMapping/>
   </p:clrMapOvr>
+  <p:timing>
+    <p:tnLst>
+      <p:par>
+        <p:cTn id="1" dur="indefinite" restart="never" nodeType="tmRoot"/>
+      </p:par>
+    </p:tnLst>
+  </p:timing>
 </p:sld>
 </file>
 
@@ -3914,6 +3930,13 @@
   <p:clrMapOvr>
     <a:masterClrMapping/>
   </p:clrMapOvr>
+  <p:timing>
+    <p:tnLst>
+      <p:par>
+        <p:cTn id="1" dur="indefinite" restart="never" nodeType="tmRoot"/>
+      </p:par>
+    </p:tnLst>
+  </p:timing>
 </p:sld>
 </file>
 

</xml_diff>